<commit_message>
PPT needs updated images and to remove trash talk
</commit_message>
<xml_diff>
--- a/docs/prez/expo poster.pptx
+++ b/docs/prez/expo poster.pptx
@@ -3177,7 +3177,7 @@
         </p:nvSpPr>
         <p:spPr>
           <a:xfrm>
-            <a:off x="25610306" y="4572000"/>
+            <a:off x="25610306" y="4419600"/>
             <a:ext cx="10051294" cy="11403122"/>
           </a:xfrm>
         </p:spPr>
@@ -3190,7 +3190,7 @@
                 <a:spcPct val="100000"/>
               </a:lnSpc>
               <a:spcAft>
-                <a:spcPts val="1800"/>
+                <a:spcPts val="1600"/>
               </a:spcAft>
             </a:pPr>
             <a:r>
@@ -3204,7 +3204,7 @@
                 <a:spcPct val="100000"/>
               </a:lnSpc>
               <a:spcAft>
-                <a:spcPts val="1800"/>
+                <a:spcPts val="1600"/>
               </a:spcAft>
             </a:pPr>
             <a:r>
@@ -3226,7 +3226,7 @@
                 <a:spcPct val="100000"/>
               </a:lnSpc>
               <a:spcAft>
-                <a:spcPts val="1800"/>
+                <a:spcPts val="1600"/>
               </a:spcAft>
             </a:pPr>
             <a:r>
@@ -3240,7 +3240,7 @@
                 <a:spcPct val="100000"/>
               </a:lnSpc>
               <a:spcAft>
-                <a:spcPts val="1800"/>
+                <a:spcPts val="1600"/>
               </a:spcAft>
             </a:pPr>
             <a:r>
@@ -3254,7 +3254,7 @@
                 <a:spcPct val="100000"/>
               </a:lnSpc>
               <a:spcAft>
-                <a:spcPts val="1800"/>
+                <a:spcPts val="1600"/>
               </a:spcAft>
             </a:pPr>
             <a:r>
@@ -3268,7 +3268,7 @@
                 <a:spcPct val="100000"/>
               </a:lnSpc>
               <a:spcAft>
-                <a:spcPts val="1800"/>
+                <a:spcPts val="1600"/>
               </a:spcAft>
             </a:pPr>
             <a:r>
@@ -3282,7 +3282,7 @@
                 <a:spcPct val="100000"/>
               </a:lnSpc>
               <a:spcAft>
-                <a:spcPts val="1800"/>
+                <a:spcPts val="1600"/>
               </a:spcAft>
             </a:pPr>
             <a:r>
@@ -3296,7 +3296,7 @@
                 <a:spcPct val="100000"/>
               </a:lnSpc>
               <a:spcAft>
-                <a:spcPts val="1800"/>
+                <a:spcPts val="1600"/>
               </a:spcAft>
             </a:pPr>
             <a:r>
@@ -3310,7 +3310,7 @@
                 <a:spcPct val="100000"/>
               </a:lnSpc>
               <a:spcAft>
-                <a:spcPts val="1800"/>
+                <a:spcPts val="1600"/>
               </a:spcAft>
             </a:pPr>
             <a:r>
@@ -3324,7 +3324,7 @@
                 <a:spcPct val="100000"/>
               </a:lnSpc>
               <a:spcAft>
-                <a:spcPts val="1800"/>
+                <a:spcPts val="1600"/>
               </a:spcAft>
             </a:pPr>
             <a:r>
@@ -3338,7 +3338,7 @@
                 <a:spcPct val="100000"/>
               </a:lnSpc>
               <a:spcAft>
-                <a:spcPts val="1800"/>
+                <a:spcPts val="1600"/>
               </a:spcAft>
             </a:pPr>
             <a:r>
@@ -3352,7 +3352,7 @@
                 <a:spcPct val="100000"/>
               </a:lnSpc>
               <a:spcAft>
-                <a:spcPts val="1800"/>
+                <a:spcPts val="1600"/>
               </a:spcAft>
             </a:pPr>
             <a:r>
@@ -3366,7 +3366,7 @@
                 <a:spcPct val="100000"/>
               </a:lnSpc>
               <a:spcAft>
-                <a:spcPts val="1800"/>
+                <a:spcPts val="1600"/>
               </a:spcAft>
             </a:pPr>
             <a:r>
@@ -3404,6 +3404,11 @@
           </a:bodyPr>
           <a:lstStyle/>
           <a:p>
+            <a:pPr>
+              <a:lnSpc>
+                <a:spcPts val="8500"/>
+              </a:lnSpc>
+            </a:pPr>
             <a:r>
               <a:rPr lang="en-US" sz="9600" dirty="0"/>
               <a:t>cereal grain Data Acquisition device</a:t>
@@ -3863,7 +3868,7 @@
             <a:pPr algn="just"/>
             <a:r>
               <a:rPr lang="en-US" dirty="0"/>
-              <a:t>After more than a century of research, wind induced crop failure remains an unsolved problem resulting in tens of billions of dollars in economic losses each year. Research from the University of Idaho is patenting tools that will allow plant breeders to develop crop varieties highly resistant to stalk failure. </a:t>
+              <a:t>After more than a century of research, wind induced crop failure remains an unsolved problem resulting in tens of billions of dollars in economic losses each year. Research from the University of Idaho is patenting tools that will allow plant breeders to develop crop varieties highly resistant to stalk failure.</a:t>
             </a:r>
           </a:p>
         </p:txBody>
@@ -3890,8 +3895,8 @@
         </p:blipFill>
         <p:spPr>
           <a:xfrm>
-            <a:off x="11870656" y="12801600"/>
-            <a:ext cx="12821833" cy="8903176"/>
+            <a:off x="11870656" y="13716000"/>
+            <a:ext cx="12821833" cy="9222712"/>
           </a:xfrm>
           <a:prstGeom prst="rect">
             <a:avLst/>
@@ -3921,7 +3926,7 @@
         <p:spPr>
           <a:xfrm>
             <a:off x="11890238" y="3657599"/>
-            <a:ext cx="12802251" cy="8079711"/>
+            <a:ext cx="12802251" cy="8994111"/>
           </a:xfrm>
           <a:prstGeom prst="rect">
             <a:avLst/>
@@ -4166,7 +4171,7 @@
         </p:nvSpPr>
         <p:spPr>
           <a:xfrm>
-            <a:off x="25610306" y="24162603"/>
+            <a:off x="25594467" y="23781603"/>
             <a:ext cx="8335107" cy="830997"/>
           </a:xfrm>
           <a:prstGeom prst="rect">
@@ -4387,7 +4392,7 @@
           <p:nvPr>
             <p:extLst>
               <p:ext uri="{D42A27DB-BD31-4B8C-83A1-F6EECF244321}">
-                <p14:modId xmlns:p14="http://schemas.microsoft.com/office/powerpoint/2010/main" val="2089522813"/>
+                <p14:modId xmlns:p14="http://schemas.microsoft.com/office/powerpoint/2010/main" val="907630574"/>
               </p:ext>
             </p:extLst>
           </p:nvPr>
@@ -5506,7 +5511,17 @@
                       </a:r>
                     </a:p>
                   </a:txBody>
-                  <a:tcPr marL="68580" marR="68580" marT="0" marB="0"/>
+                  <a:tcPr marL="68580" marR="68580" marT="0" marB="0">
+                    <a:lnB w="12700" cap="flat" cmpd="sng" algn="ctr">
+                      <a:solidFill>
+                        <a:schemeClr val="tx1"/>
+                      </a:solidFill>
+                      <a:prstDash val="solid"/>
+                      <a:round/>
+                      <a:headEnd type="none" w="med" len="med"/>
+                      <a:tailEnd type="none" w="med" len="med"/>
+                    </a:lnB>
+                  </a:tcPr>
                 </a:tc>
                 <a:tc>
                   <a:txBody>
@@ -5535,7 +5550,17 @@
                       </a:r>
                     </a:p>
                   </a:txBody>
-                  <a:tcPr marL="68580" marR="68580" marT="0" marB="0"/>
+                  <a:tcPr marL="68580" marR="68580" marT="0" marB="0">
+                    <a:lnB w="12700" cap="flat" cmpd="sng" algn="ctr">
+                      <a:solidFill>
+                        <a:schemeClr val="tx1"/>
+                      </a:solidFill>
+                      <a:prstDash val="solid"/>
+                      <a:round/>
+                      <a:headEnd type="none" w="med" len="med"/>
+                      <a:tailEnd type="none" w="med" len="med"/>
+                    </a:lnB>
+                  </a:tcPr>
                 </a:tc>
                 <a:tc>
                   <a:txBody>
@@ -5564,7 +5589,17 @@
                       </a:r>
                     </a:p>
                   </a:txBody>
-                  <a:tcPr marL="68580" marR="68580" marT="0" marB="0"/>
+                  <a:tcPr marL="68580" marR="68580" marT="0" marB="0">
+                    <a:lnB w="12700" cap="flat" cmpd="sng" algn="ctr">
+                      <a:solidFill>
+                        <a:schemeClr val="tx1"/>
+                      </a:solidFill>
+                      <a:prstDash val="solid"/>
+                      <a:round/>
+                      <a:headEnd type="none" w="med" len="med"/>
+                      <a:tailEnd type="none" w="med" len="med"/>
+                    </a:lnB>
+                  </a:tcPr>
                 </a:tc>
                 <a:extLst>
                   <a:ext uri="{0D108BD9-81ED-4DB2-BD59-A6C34878D82A}">
@@ -5592,7 +5627,7 @@
         </p:nvSpPr>
         <p:spPr>
           <a:xfrm>
-            <a:off x="914400" y="8610600"/>
+            <a:off x="914400" y="8617803"/>
             <a:ext cx="8018880" cy="830997"/>
           </a:xfrm>
           <a:prstGeom prst="rect">
@@ -6037,7 +6072,7 @@
         </p:nvSpPr>
         <p:spPr>
           <a:xfrm>
-            <a:off x="25610306" y="16230600"/>
+            <a:off x="25610306" y="15621000"/>
             <a:ext cx="8335107" cy="830997"/>
           </a:xfrm>
           <a:prstGeom prst="rect">
@@ -6264,8 +6299,8 @@
         </p:nvSpPr>
         <p:spPr>
           <a:xfrm>
-            <a:off x="25594467" y="24993600"/>
-            <a:ext cx="10010793" cy="1607363"/>
+            <a:off x="25594467" y="24536400"/>
+            <a:ext cx="10010793" cy="1966436"/>
           </a:xfrm>
           <a:prstGeom prst="rect">
             <a:avLst/>
@@ -6463,29 +6498,52 @@
             </a:lvl9pPr>
           </a:lstStyle>
           <a:p>
-            <a:pPr algn="just"/>
-            <a:r>
-              <a:rPr lang="en-US" dirty="0"/>
-              <a:t>Conrad, Ankit, Dr. Robertson, The university, my parents</a:t>
+            <a:pPr algn="just">
+              <a:spcAft>
+                <a:spcPts val="0"/>
+              </a:spcAft>
+            </a:pPr>
+            <a:r>
+              <a:rPr lang="en-US" dirty="0" err="1"/>
+              <a:t>Cracka</a:t>
+            </a:r>
+            <a:r>
+              <a:rPr lang="en-US" dirty="0"/>
+              <a:t> of da Whip: Dr. Daniel Robertson (Big </a:t>
+            </a:r>
+            <a:r>
+              <a:rPr lang="en-US" dirty="0" err="1"/>
+              <a:t>Chungus</a:t>
+            </a:r>
+            <a:r>
+              <a:rPr lang="en-US" dirty="0"/>
+              <a:t>)</a:t>
             </a:r>
           </a:p>
           <a:p>
-            <a:pPr algn="just"/>
-            <a:r>
-              <a:rPr lang="en-US" dirty="0"/>
-              <a:t>, the academy, Big </a:t>
-            </a:r>
-            <a:r>
-              <a:rPr lang="en-US" dirty="0" err="1"/>
-              <a:t>Chungus</a:t>
-            </a:r>
-            <a:r>
-              <a:rPr lang="en-US" dirty="0"/>
-              <a:t>, Dr. </a:t>
-            </a:r>
-            <a:r>
-              <a:rPr lang="en-US" dirty="0" err="1"/>
-              <a:t>Frenzel</a:t>
+            <a:pPr algn="just">
+              <a:spcAft>
+                <a:spcPts val="0"/>
+              </a:spcAft>
+            </a:pPr>
+            <a:r>
+              <a:rPr lang="en-US" dirty="0"/>
+              <a:t>Software GOAT: Conrad Mearns</a:t>
+            </a:r>
+          </a:p>
+          <a:p>
+            <a:pPr algn="just">
+              <a:spcAft>
+                <a:spcPts val="0"/>
+              </a:spcAft>
+            </a:pPr>
+            <a:r>
+              <a:rPr lang="en-US" dirty="0"/>
+              <a:t>That One Guy: Ankit </a:t>
+            </a:r>
+            <a:r>
+              <a:rPr lang="en-US" dirty="0" err="1"/>
+              <a:t>Guthra</a:t>
             </a:r>
             <a:endParaRPr lang="en-US" dirty="0"/>
           </a:p>
@@ -6505,7 +6563,7 @@
           </p:cNvPicPr>
           <p:nvPr/>
         </p:nvPicPr>
-        <p:blipFill>
+        <p:blipFill rotWithShape="1">
           <a:blip r:embed="rId4" cstate="print">
             <a:extLst>
               <a:ext uri="{28A0092B-C50C-407E-A947-70E740481C1C}">
@@ -6513,248 +6571,19 @@
               </a:ext>
             </a:extLst>
           </a:blip>
-          <a:stretch>
-            <a:fillRect/>
-          </a:stretch>
+          <a:srcRect t="5646"/>
+          <a:stretch/>
         </p:blipFill>
         <p:spPr>
           <a:xfrm>
-            <a:off x="25984200" y="17158906"/>
-            <a:ext cx="9237442" cy="6158294"/>
+            <a:off x="25594467" y="16648757"/>
+            <a:ext cx="9994954" cy="6287033"/>
           </a:xfrm>
           <a:prstGeom prst="rect">
             <a:avLst/>
           </a:prstGeom>
         </p:spPr>
       </p:pic>
-      <p:sp>
-        <p:nvSpPr>
-          <p:cNvPr id="26" name="Text Placeholder 2">
-            <a:extLst>
-              <a:ext uri="{FF2B5EF4-FFF2-40B4-BE49-F238E27FC236}">
-                <a16:creationId xmlns:a16="http://schemas.microsoft.com/office/drawing/2014/main" id="{3012BBF1-0DCD-4F71-BEE7-320A8522E41A}"/>
-              </a:ext>
-            </a:extLst>
-          </p:cNvPr>
-          <p:cNvSpPr txBox="1">
-            <a:spLocks/>
-          </p:cNvSpPr>
-          <p:nvPr/>
-        </p:nvSpPr>
-        <p:spPr>
-          <a:xfrm>
-            <a:off x="26573936" y="23317200"/>
-            <a:ext cx="8124033" cy="607089"/>
-          </a:xfrm>
-          <a:prstGeom prst="rect">
-            <a:avLst/>
-          </a:prstGeom>
-        </p:spPr>
-        <p:txBody>
-          <a:bodyPr vert="horz" wrap="square" lIns="0" tIns="0" rIns="0" bIns="0" rtlCol="0">
-            <a:spAutoFit/>
-          </a:bodyPr>
-          <a:lstStyle>
-            <a:lvl1pPr marL="0" marR="0" indent="0" algn="l" defTabSz="2438361" rtl="0" eaLnBrk="1" fontAlgn="auto" latinLnBrk="0" hangingPunct="1">
-              <a:lnSpc>
-                <a:spcPts val="5300"/>
-              </a:lnSpc>
-              <a:spcBef>
-                <a:spcPts val="0"/>
-              </a:spcBef>
-              <a:spcAft>
-                <a:spcPts val="2500"/>
-              </a:spcAft>
-              <a:buClrTx/>
-              <a:buSzTx/>
-              <a:buFont typeface="Arial" panose="020B0604020202020204" pitchFamily="34" charset="0"/>
-              <a:buNone/>
-              <a:tabLst/>
-              <a:defRPr lang="en-US" sz="3300" b="0" i="0" kern="1200" baseline="0" smtClean="0">
-                <a:solidFill>
-                  <a:schemeClr val="tx1"/>
-                </a:solidFill>
-                <a:effectLst/>
-                <a:latin typeface="Franklin Gothic Book" panose="020B0503020102020204" pitchFamily="34" charset="0"/>
-                <a:ea typeface="Franklin Gothic Book" panose="020B0503020102020204" pitchFamily="34" charset="0"/>
-                <a:cs typeface="Franklin Gothic Book" panose="020B0503020102020204" pitchFamily="34" charset="0"/>
-              </a:defRPr>
-            </a:lvl1pPr>
-            <a:lvl2pPr marL="914362" indent="-571477" algn="l" defTabSz="2438361" rtl="0" eaLnBrk="1" latinLnBrk="0" hangingPunct="1">
-              <a:lnSpc>
-                <a:spcPts val="5300"/>
-              </a:lnSpc>
-              <a:spcBef>
-                <a:spcPts val="0"/>
-              </a:spcBef>
-              <a:spcAft>
-                <a:spcPts val="2500"/>
-              </a:spcAft>
-              <a:buClr>
-                <a:schemeClr val="accent3"/>
-              </a:buClr>
-              <a:buSzPct val="120000"/>
-              <a:buFont typeface="Wingdings" charset="2"/>
-              <a:buChar char="§"/>
-              <a:defRPr sz="3300" b="0" i="0" kern="1200">
-                <a:solidFill>
-                  <a:schemeClr val="tx1"/>
-                </a:solidFill>
-                <a:latin typeface="Franklin Gothic Book" panose="020B0503020102020204" pitchFamily="34" charset="0"/>
-                <a:ea typeface="Franklin Gothic Book" panose="020B0503020102020204" pitchFamily="34" charset="0"/>
-                <a:cs typeface="Franklin Gothic Book" panose="020B0503020102020204" pitchFamily="34" charset="0"/>
-              </a:defRPr>
-            </a:lvl2pPr>
-            <a:lvl3pPr marL="1462978" indent="-571477" algn="l" defTabSz="2438361" rtl="0" eaLnBrk="1" latinLnBrk="0" hangingPunct="1">
-              <a:lnSpc>
-                <a:spcPts val="5300"/>
-              </a:lnSpc>
-              <a:spcBef>
-                <a:spcPts val="0"/>
-              </a:spcBef>
-              <a:spcAft>
-                <a:spcPts val="2500"/>
-              </a:spcAft>
-              <a:buClr>
-                <a:schemeClr val="accent3"/>
-              </a:buClr>
-              <a:buSzPct val="120000"/>
-              <a:buFont typeface="Wingdings" charset="2"/>
-              <a:buChar char="§"/>
-              <a:defRPr sz="3300" b="0" i="0" kern="1200">
-                <a:solidFill>
-                  <a:schemeClr val="tx1"/>
-                </a:solidFill>
-                <a:latin typeface="Franklin Gothic Book" panose="020B0503020102020204" pitchFamily="34" charset="0"/>
-                <a:ea typeface="Franklin Gothic Book" panose="020B0503020102020204" pitchFamily="34" charset="0"/>
-                <a:cs typeface="Franklin Gothic Book" panose="020B0503020102020204" pitchFamily="34" charset="0"/>
-              </a:defRPr>
-            </a:lvl3pPr>
-            <a:lvl4pPr marL="2103032" indent="-571477" algn="l" defTabSz="2438361" rtl="0" eaLnBrk="1" latinLnBrk="0" hangingPunct="1">
-              <a:lnSpc>
-                <a:spcPts val="5300"/>
-              </a:lnSpc>
-              <a:spcBef>
-                <a:spcPts val="0"/>
-              </a:spcBef>
-              <a:spcAft>
-                <a:spcPts val="2500"/>
-              </a:spcAft>
-              <a:buClr>
-                <a:schemeClr val="accent3"/>
-              </a:buClr>
-              <a:buSzPct val="120000"/>
-              <a:buFont typeface="Wingdings" charset="2"/>
-              <a:buChar char="§"/>
-              <a:defRPr sz="3300" b="0" i="0" kern="1200">
-                <a:solidFill>
-                  <a:schemeClr val="tx1"/>
-                </a:solidFill>
-                <a:latin typeface="Franklin Gothic Book" panose="020B0503020102020204" pitchFamily="34" charset="0"/>
-                <a:ea typeface="Franklin Gothic Book" panose="020B0503020102020204" pitchFamily="34" charset="0"/>
-                <a:cs typeface="Franklin Gothic Book" panose="020B0503020102020204" pitchFamily="34" charset="0"/>
-              </a:defRPr>
-            </a:lvl4pPr>
-            <a:lvl5pPr marL="2651650" indent="-571477" algn="l" defTabSz="2438361" rtl="0" eaLnBrk="1" latinLnBrk="0" hangingPunct="1">
-              <a:lnSpc>
-                <a:spcPts val="5300"/>
-              </a:lnSpc>
-              <a:spcBef>
-                <a:spcPts val="0"/>
-              </a:spcBef>
-              <a:spcAft>
-                <a:spcPts val="2500"/>
-              </a:spcAft>
-              <a:buClr>
-                <a:schemeClr val="accent3"/>
-              </a:buClr>
-              <a:buSzPct val="120000"/>
-              <a:buFont typeface="Wingdings" charset="2"/>
-              <a:buChar char="§"/>
-              <a:defRPr sz="3300" b="0" i="0" kern="1200">
-                <a:solidFill>
-                  <a:schemeClr val="tx1"/>
-                </a:solidFill>
-                <a:latin typeface="Franklin Gothic Book" panose="020B0503020102020204" pitchFamily="34" charset="0"/>
-                <a:ea typeface="Franklin Gothic Book" panose="020B0503020102020204" pitchFamily="34" charset="0"/>
-                <a:cs typeface="Franklin Gothic Book" panose="020B0503020102020204" pitchFamily="34" charset="0"/>
-              </a:defRPr>
-            </a:lvl5pPr>
-            <a:lvl6pPr marL="6705487" indent="-609589" algn="l" defTabSz="2438361" rtl="0" eaLnBrk="1" latinLnBrk="0" hangingPunct="1">
-              <a:spcBef>
-                <a:spcPct val="20000"/>
-              </a:spcBef>
-              <a:buFont typeface="Arial" panose="020B0604020202020204" pitchFamily="34" charset="0"/>
-              <a:buChar char="•"/>
-              <a:defRPr sz="5300" kern="1200">
-                <a:solidFill>
-                  <a:schemeClr val="tx1"/>
-                </a:solidFill>
-                <a:latin typeface="+mn-lt"/>
-                <a:ea typeface="+mn-ea"/>
-                <a:cs typeface="+mn-cs"/>
-              </a:defRPr>
-            </a:lvl6pPr>
-            <a:lvl7pPr marL="7924669" indent="-609589" algn="l" defTabSz="2438361" rtl="0" eaLnBrk="1" latinLnBrk="0" hangingPunct="1">
-              <a:spcBef>
-                <a:spcPct val="20000"/>
-              </a:spcBef>
-              <a:buFont typeface="Arial" panose="020B0604020202020204" pitchFamily="34" charset="0"/>
-              <a:buChar char="•"/>
-              <a:defRPr sz="5300" kern="1200">
-                <a:solidFill>
-                  <a:schemeClr val="tx1"/>
-                </a:solidFill>
-                <a:latin typeface="+mn-lt"/>
-                <a:ea typeface="+mn-ea"/>
-                <a:cs typeface="+mn-cs"/>
-              </a:defRPr>
-            </a:lvl7pPr>
-            <a:lvl8pPr marL="9143849" indent="-609589" algn="l" defTabSz="2438361" rtl="0" eaLnBrk="1" latinLnBrk="0" hangingPunct="1">
-              <a:spcBef>
-                <a:spcPct val="20000"/>
-              </a:spcBef>
-              <a:buFont typeface="Arial" panose="020B0604020202020204" pitchFamily="34" charset="0"/>
-              <a:buChar char="•"/>
-              <a:defRPr sz="5300" kern="1200">
-                <a:solidFill>
-                  <a:schemeClr val="tx1"/>
-                </a:solidFill>
-                <a:latin typeface="+mn-lt"/>
-                <a:ea typeface="+mn-ea"/>
-                <a:cs typeface="+mn-cs"/>
-              </a:defRPr>
-            </a:lvl8pPr>
-            <a:lvl9pPr marL="10363028" indent="-609589" algn="l" defTabSz="2438361" rtl="0" eaLnBrk="1" latinLnBrk="0" hangingPunct="1">
-              <a:spcBef>
-                <a:spcPct val="20000"/>
-              </a:spcBef>
-              <a:buFont typeface="Arial" panose="020B0604020202020204" pitchFamily="34" charset="0"/>
-              <a:buChar char="•"/>
-              <a:defRPr sz="5300" kern="1200">
-                <a:solidFill>
-                  <a:schemeClr val="tx1"/>
-                </a:solidFill>
-                <a:latin typeface="+mn-lt"/>
-                <a:ea typeface="+mn-ea"/>
-                <a:cs typeface="+mn-cs"/>
-              </a:defRPr>
-            </a:lvl9pPr>
-          </a:lstStyle>
-          <a:p>
-            <a:pPr algn="ctr"/>
-            <a:r>
-              <a:rPr lang="en-US" dirty="0"/>
-              <a:t>Figure X: Ryan Donahue and Kennedy </a:t>
-            </a:r>
-            <a:r>
-              <a:rPr lang="en-US" dirty="0" err="1"/>
-              <a:t>Caisley</a:t>
-            </a:r>
-            <a:endParaRPr lang="en-US" dirty="0"/>
-          </a:p>
-        </p:txBody>
-      </p:sp>
       <p:sp>
         <p:nvSpPr>
           <p:cNvPr id="27" name="Text Placeholder 1">
@@ -6771,7 +6600,7 @@
         </p:nvSpPr>
         <p:spPr>
           <a:xfrm>
-            <a:off x="11933901" y="22791003"/>
+            <a:off x="11933901" y="23781603"/>
             <a:ext cx="8335107" cy="830997"/>
           </a:xfrm>
           <a:prstGeom prst="rect">
@@ -6993,8 +6822,8 @@
         </p:nvSpPr>
         <p:spPr>
           <a:xfrm>
-            <a:off x="11933901" y="23871491"/>
-            <a:ext cx="12758588" cy="1286763"/>
+            <a:off x="11933901" y="24551164"/>
+            <a:ext cx="12758588" cy="1966436"/>
           </a:xfrm>
           <a:prstGeom prst="rect">
             <a:avLst/>
@@ -7195,7 +7024,15 @@
             <a:pPr algn="just"/>
             <a:r>
               <a:rPr lang="en-US" dirty="0"/>
-              <a:t>Implement with the three devices, continue writing code, daughter boards</a:t>
+              <a:t>Create application software for existing devices using the newly developed hardware and device drivers found on the project </a:t>
+            </a:r>
+            <a:r>
+              <a:rPr lang="en-US" dirty="0" err="1"/>
+              <a:t>Github</a:t>
+            </a:r>
+            <a:r>
+              <a:rPr lang="en-US" dirty="0"/>
+              <a:t> repository: https://github.com/kcaisley/CropTop</a:t>
             </a:r>
           </a:p>
         </p:txBody>
@@ -7216,7 +7053,7 @@
         </p:nvSpPr>
         <p:spPr>
           <a:xfrm>
-            <a:off x="14219555" y="21704775"/>
+            <a:off x="14219555" y="22938711"/>
             <a:ext cx="8124033" cy="607089"/>
           </a:xfrm>
           <a:prstGeom prst="rect">
@@ -7452,7 +7289,7 @@
         </p:nvSpPr>
         <p:spPr>
           <a:xfrm>
-            <a:off x="14251178" y="11734800"/>
+            <a:off x="14251178" y="12651711"/>
             <a:ext cx="8124033" cy="607089"/>
           </a:xfrm>
           <a:prstGeom prst="rect">
@@ -7669,10 +7506,118 @@
       </p:sp>
       <p:sp>
         <p:nvSpPr>
-          <p:cNvPr id="31" name="Text Placeholder 1">
+          <p:cNvPr id="2" name="Rectangle 1">
             <a:extLst>
               <a:ext uri="{FF2B5EF4-FFF2-40B4-BE49-F238E27FC236}">
-                <a16:creationId xmlns:a16="http://schemas.microsoft.com/office/drawing/2014/main" id="{836B578F-0A7F-45B2-A4AE-DE430029B65D}"/>
+                <a16:creationId xmlns:a16="http://schemas.microsoft.com/office/drawing/2014/main" id="{959DB4B2-0B20-4DD6-B07C-6AE57F0DD64C}"/>
+              </a:ext>
+            </a:extLst>
+          </p:cNvPr>
+          <p:cNvSpPr/>
+          <p:nvPr/>
+        </p:nvSpPr>
+        <p:spPr>
+          <a:xfrm>
+            <a:off x="896520" y="26441400"/>
+            <a:ext cx="10069175" cy="304801"/>
+          </a:xfrm>
+          <a:prstGeom prst="rect">
+            <a:avLst/>
+          </a:prstGeom>
+          <a:solidFill>
+            <a:schemeClr val="bg1"/>
+          </a:solidFill>
+          <a:ln>
+            <a:solidFill>
+              <a:schemeClr val="bg1"/>
+            </a:solidFill>
+          </a:ln>
+        </p:spPr>
+        <p:style>
+          <a:lnRef idx="2">
+            <a:schemeClr val="accent1">
+              <a:shade val="50000"/>
+            </a:schemeClr>
+          </a:lnRef>
+          <a:fillRef idx="1">
+            <a:schemeClr val="accent1"/>
+          </a:fillRef>
+          <a:effectRef idx="0">
+            <a:schemeClr val="accent1"/>
+          </a:effectRef>
+          <a:fontRef idx="minor">
+            <a:schemeClr val="lt1"/>
+          </a:fontRef>
+        </p:style>
+        <p:txBody>
+          <a:bodyPr rtlCol="0" anchor="ctr"/>
+          <a:lstStyle/>
+          <a:p>
+            <a:pPr algn="ctr"/>
+            <a:endParaRPr lang="en-US"/>
+          </a:p>
+        </p:txBody>
+      </p:sp>
+      <p:sp>
+        <p:nvSpPr>
+          <p:cNvPr id="33" name="Rectangle 32">
+            <a:extLst>
+              <a:ext uri="{FF2B5EF4-FFF2-40B4-BE49-F238E27FC236}">
+                <a16:creationId xmlns:a16="http://schemas.microsoft.com/office/drawing/2014/main" id="{7D09FB83-AF25-43E6-B3D0-44A3959E6441}"/>
+              </a:ext>
+            </a:extLst>
+          </p:cNvPr>
+          <p:cNvSpPr/>
+          <p:nvPr/>
+        </p:nvSpPr>
+        <p:spPr>
+          <a:xfrm>
+            <a:off x="762000" y="12725400"/>
+            <a:ext cx="10439400" cy="271288"/>
+          </a:xfrm>
+          <a:prstGeom prst="rect">
+            <a:avLst/>
+          </a:prstGeom>
+          <a:solidFill>
+            <a:schemeClr val="bg1"/>
+          </a:solidFill>
+          <a:ln>
+            <a:solidFill>
+              <a:schemeClr val="bg1"/>
+            </a:solidFill>
+          </a:ln>
+        </p:spPr>
+        <p:style>
+          <a:lnRef idx="2">
+            <a:schemeClr val="accent1">
+              <a:shade val="50000"/>
+            </a:schemeClr>
+          </a:lnRef>
+          <a:fillRef idx="1">
+            <a:schemeClr val="accent1"/>
+          </a:fillRef>
+          <a:effectRef idx="0">
+            <a:schemeClr val="accent1"/>
+          </a:effectRef>
+          <a:fontRef idx="minor">
+            <a:schemeClr val="lt1"/>
+          </a:fontRef>
+        </p:style>
+        <p:txBody>
+          <a:bodyPr rtlCol="0" anchor="ctr"/>
+          <a:lstStyle/>
+          <a:p>
+            <a:pPr algn="ctr"/>
+            <a:endParaRPr lang="en-US"/>
+          </a:p>
+        </p:txBody>
+      </p:sp>
+      <p:sp>
+        <p:nvSpPr>
+          <p:cNvPr id="34" name="Text Placeholder 2">
+            <a:extLst>
+              <a:ext uri="{FF2B5EF4-FFF2-40B4-BE49-F238E27FC236}">
+                <a16:creationId xmlns:a16="http://schemas.microsoft.com/office/drawing/2014/main" id="{5EB616FE-FC8A-49F9-8470-AF834B5C5738}"/>
               </a:ext>
             </a:extLst>
           </p:cNvPr>
@@ -7683,8 +7628,8 @@
         </p:nvSpPr>
         <p:spPr>
           <a:xfrm>
-            <a:off x="24907143" y="16230600"/>
-            <a:ext cx="8335107" cy="830997"/>
+            <a:off x="26573936" y="22938711"/>
+            <a:ext cx="8124033" cy="607089"/>
           </a:xfrm>
           <a:prstGeom prst="rect">
             <a:avLst/>
@@ -7695,9 +7640,9 @@
             <a:spAutoFit/>
           </a:bodyPr>
           <a:lstStyle>
-            <a:lvl1pPr marL="0" indent="0" algn="l" defTabSz="2438361" rtl="0" eaLnBrk="1" latinLnBrk="0" hangingPunct="1">
+            <a:lvl1pPr marL="0" marR="0" indent="0" algn="l" defTabSz="2438361" rtl="0" eaLnBrk="1" fontAlgn="auto" latinLnBrk="0" hangingPunct="1">
               <a:lnSpc>
-                <a:spcPct val="100000"/>
+                <a:spcPts val="5300"/>
               </a:lnSpc>
               <a:spcBef>
                 <a:spcPts val="0"/>
@@ -7705,16 +7650,16 @@
               <a:spcAft>
                 <a:spcPts val="2500"/>
               </a:spcAft>
-              <a:buClr>
-                <a:schemeClr val="accent3"/>
-              </a:buClr>
-              <a:buSzPct val="120000"/>
-              <a:buFont typeface="Wingdings" charset="2"/>
+              <a:buClrTx/>
+              <a:buSzTx/>
+              <a:buFont typeface="Arial" panose="020B0604020202020204" pitchFamily="34" charset="0"/>
               <a:buNone/>
-              <a:defRPr sz="5400" b="1" i="0" kern="1200" cap="all" baseline="0">
-                <a:solidFill>
-                  <a:schemeClr val="tx1"/>
-                </a:solidFill>
+              <a:tabLst/>
+              <a:defRPr lang="en-US" sz="3300" b="0" i="0" kern="1200" baseline="0" smtClean="0">
+                <a:solidFill>
+                  <a:schemeClr val="tx1"/>
+                </a:solidFill>
+                <a:effectLst/>
                 <a:latin typeface="Franklin Gothic Book" panose="020B0503020102020204" pitchFamily="34" charset="0"/>
                 <a:ea typeface="Franklin Gothic Book" panose="020B0503020102020204" pitchFamily="34" charset="0"/>
                 <a:cs typeface="Franklin Gothic Book" panose="020B0503020102020204" pitchFamily="34" charset="0"/>
@@ -7882,13 +7827,14 @@
             </a:lvl9pPr>
           </a:lstStyle>
           <a:p>
-            <a:r>
-              <a:rPr lang="en-US" dirty="0"/>
-              <a:t>Team </a:t>
-            </a:r>
-            <a:r>
-              <a:rPr lang="en-US" dirty="0" err="1"/>
-              <a:t>CropTop</a:t>
+            <a:pPr algn="ctr"/>
+            <a:r>
+              <a:rPr lang="en-US" dirty="0"/>
+              <a:t>Figure 3: Ryan Donahue and Kennedy </a:t>
+            </a:r>
+            <a:r>
+              <a:rPr lang="en-US" dirty="0" err="1"/>
+              <a:t>Caisley</a:t>
             </a:r>
             <a:endParaRPr lang="en-US" dirty="0"/>
           </a:p>

</xml_diff>

<commit_message>
Removed trash talk, needs photos
</commit_message>
<xml_diff>
--- a/docs/prez/expo poster.pptx
+++ b/docs/prez/expo poster.pptx
@@ -195,7 +195,7 @@
               <a:rPr lang="ru-RU" smtClean="0">
                 <a:latin typeface="Archivo Regular" charset="0"/>
               </a:rPr>
-              <a:t>22.04.2019</a:t>
+              <a:t>25.04.2019</a:t>
             </a:fld>
             <a:endParaRPr lang="ru-RU" dirty="0">
               <a:latin typeface="Archivo Regular" charset="0"/>
@@ -407,7 +407,7 @@
             <a:fld id="{E7E03F2D-4C40-8A47-B131-FA84CE0A3C0A}" type="datetimeFigureOut">
               <a:rPr lang="ru-RU" smtClean="0"/>
               <a:pPr/>
-              <a:t>22.04.2019</a:t>
+              <a:t>25.04.2019</a:t>
             </a:fld>
             <a:endParaRPr lang="ru-RU" dirty="0"/>
           </a:p>
@@ -6051,7 +6051,7 @@
             <a:pPr algn="just"/>
             <a:r>
               <a:rPr lang="en-US" dirty="0"/>
-              <a:t>Plans for a commercially viable data acquisition platform were designed then sent to a contract manufacturer for assembly. The new embedded hardware improved upon the prototype devices, currently being used by the client, in a number of ways:</a:t>
+              <a:t>Plans for a commercially viable data acquisition platform were designed then sent to a contract manufacturer for assembly. The new embedded hardware improves upon the prototype devices, currently being used by the client, in a number of ways:</a:t>
             </a:r>
           </a:p>
         </p:txBody>
@@ -6504,20 +6504,8 @@
               </a:spcAft>
             </a:pPr>
             <a:r>
-              <a:rPr lang="en-US" dirty="0" err="1"/>
-              <a:t>Cracka</a:t>
-            </a:r>
-            <a:r>
-              <a:rPr lang="en-US" dirty="0"/>
-              <a:t> of da Whip: Dr. Daniel Robertson (Big </a:t>
-            </a:r>
-            <a:r>
-              <a:rPr lang="en-US" dirty="0" err="1"/>
-              <a:t>Chungus</a:t>
-            </a:r>
-            <a:r>
-              <a:rPr lang="en-US" dirty="0"/>
-              <a:t>)</a:t>
+              <a:rPr lang="en-US" dirty="0"/>
+              <a:t>Client and Advisor: Dr. Daniel Robertson</a:t>
             </a:r>
           </a:p>
           <a:p>
@@ -6528,24 +6516,8 @@
             </a:pPr>
             <a:r>
               <a:rPr lang="en-US" dirty="0"/>
-              <a:t>Software GOAT: Conrad Mearns</a:t>
-            </a:r>
-          </a:p>
-          <a:p>
-            <a:pPr algn="just">
-              <a:spcAft>
-                <a:spcPts val="0"/>
-              </a:spcAft>
-            </a:pPr>
-            <a:r>
-              <a:rPr lang="en-US" dirty="0"/>
-              <a:t>That One Guy: Ankit </a:t>
-            </a:r>
-            <a:r>
-              <a:rPr lang="en-US" dirty="0" err="1"/>
-              <a:t>Guthra</a:t>
-            </a:r>
-            <a:endParaRPr lang="en-US" dirty="0"/>
+              <a:t>Additional thanks to Conrad Mearns for LCD firmware development and Ankit Gupta for help with the project.</a:t>
+            </a:r>
           </a:p>
         </p:txBody>
       </p:sp>
@@ -7024,7 +6996,15 @@
             <a:pPr algn="just"/>
             <a:r>
               <a:rPr lang="en-US" dirty="0"/>
-              <a:t>Create application software for existing devices using the newly developed hardware and device drivers found on the project </a:t>
+              <a:t>Create application software for existing devices using the newly developed hardware and device drivers found on the </a:t>
+            </a:r>
+            <a:r>
+              <a:rPr lang="en-US" dirty="0" err="1"/>
+              <a:t>CropTop</a:t>
+            </a:r>
+            <a:r>
+              <a:rPr lang="en-US" dirty="0"/>
+              <a:t> </a:t>
             </a:r>
             <a:r>
               <a:rPr lang="en-US" dirty="0" err="1"/>
@@ -7628,8 +7608,8 @@
         </p:nvSpPr>
         <p:spPr>
           <a:xfrm>
-            <a:off x="26573936" y="22938711"/>
-            <a:ext cx="8124033" cy="607089"/>
+            <a:off x="26015921" y="22970274"/>
+            <a:ext cx="9240064" cy="607089"/>
           </a:xfrm>
           <a:prstGeom prst="rect">
             <a:avLst/>
@@ -7830,7 +7810,7 @@
             <a:pPr algn="ctr"/>
             <a:r>
               <a:rPr lang="en-US" dirty="0"/>
-              <a:t>Figure 3: Ryan Donahue and Kennedy </a:t>
+              <a:t>Left to Right: Ryan Donahue and Kennedy </a:t>
             </a:r>
             <a:r>
               <a:rPr lang="en-US" dirty="0" err="1"/>

</xml_diff>